<commit_message>
06-compliance-frameworks added DoD STIG References
</commit_message>
<xml_diff>
--- a/06-compliance-frameworks-inspec.pptx
+++ b/06-compliance-frameworks-inspec.pptx
@@ -6,10 +6,10 @@
     <p:sldMasterId id="2147483847" r:id="rId6"/>
   </p:sldMasterIdLst>
   <p:notesMasterIdLst>
-    <p:notesMasterId r:id="rId48"/>
+    <p:notesMasterId r:id="rId49"/>
   </p:notesMasterIdLst>
   <p:handoutMasterIdLst>
-    <p:handoutMasterId r:id="rId49"/>
+    <p:handoutMasterId r:id="rId50"/>
   </p:handoutMasterIdLst>
   <p:sldIdLst>
     <p:sldId id="256" r:id="rId7"/>
@@ -49,10 +49,11 @@
     <p:sldId id="383" r:id="rId41"/>
     <p:sldId id="384" r:id="rId42"/>
     <p:sldId id="385" r:id="rId43"/>
-    <p:sldId id="380" r:id="rId44"/>
-    <p:sldId id="276" r:id="rId45"/>
-    <p:sldId id="376" r:id="rId46"/>
-    <p:sldId id="267" r:id="rId47"/>
+    <p:sldId id="387" r:id="rId44"/>
+    <p:sldId id="386" r:id="rId45"/>
+    <p:sldId id="276" r:id="rId46"/>
+    <p:sldId id="376" r:id="rId47"/>
+    <p:sldId id="267" r:id="rId48"/>
   </p:sldIdLst>
   <p:sldSz cx="16256000" cy="9144000"/>
   <p:notesSz cx="6858000" cy="9144000"/>
@@ -314,7 +315,7 @@
               <a:pPr>
                 <a:defRPr/>
               </a:pPr>
-              <a:t>2016-02-09</a:t>
+              <a:t>2016-02-10</a:t>
             </a:fld>
             <a:endParaRPr lang="en-US" dirty="0"/>
           </a:p>
@@ -497,7 +498,7 @@
               <a:pPr>
                 <a:defRPr/>
               </a:pPr>
-              <a:t>2016-02-09</a:t>
+              <a:t>2016-02-10</a:t>
             </a:fld>
             <a:endParaRPr lang="en-US" dirty="0"/>
           </a:p>
@@ -4101,10 +4102,6 @@
           <a:bodyPr/>
           <a:lstStyle/>
           <a:p>
-            <a:r>
-              <a:rPr lang="en-US" dirty="0" smtClean="0"/>
-              <a:t>TBD</a:t>
-            </a:r>
             <a:endParaRPr lang="en-US" dirty="0"/>
           </a:p>
         </p:txBody>
@@ -4680,7 +4677,7 @@
           <a:p>
             <a:r>
               <a:rPr lang="en-US" dirty="0" smtClean="0"/>
-              <a:t>Try to run the STIG Viewer. If it fails due to a Java error, </a:t>
+              <a:t>Try to run the STIG Viewer. If it fails due to a Java error, you may need to install the latest Java Runtime Environment (JRE) as indicated on the next slide.</a:t>
             </a:r>
           </a:p>
           <a:p>
@@ -5508,7 +5505,6 @@
               <a:rPr lang="en-US" dirty="0" smtClean="0"/>
               <a:t>TBD SCAP Roadmap.</a:t>
             </a:r>
-            <a:endParaRPr lang="en-US" dirty="0" smtClean="0"/>
           </a:p>
         </p:txBody>
       </p:sp>
@@ -5675,7 +5671,7 @@
           <a:p>
             <a:r>
               <a:rPr lang="en-US" baseline="0" dirty="0" smtClean="0"/>
-              <a:t>The image on the left shows a Chef Compliance Profile that was written based on the details of  this </a:t>
+              <a:t>The image on the left shows a Chef Compliance Profile that was written based on the details of this </a:t>
             </a:r>
             <a:r>
               <a:rPr lang="en-US" dirty="0" smtClean="0"/>
@@ -5701,7 +5697,6 @@
               <a:rPr lang="en-US" baseline="0" dirty="0" smtClean="0"/>
               <a:t>rules.</a:t>
             </a:r>
-            <a:endParaRPr lang="en-US" baseline="0" dirty="0" smtClean="0"/>
           </a:p>
         </p:txBody>
       </p:sp>
@@ -5977,7 +5972,6 @@
               <a:rPr lang="en-US" dirty="0" smtClean="0"/>
               <a:t>TBD SCAP Roadmap.</a:t>
             </a:r>
-            <a:endParaRPr lang="en-US" dirty="0" smtClean="0"/>
           </a:p>
         </p:txBody>
       </p:sp>
@@ -6004,7 +5998,7 @@
               <a:pPr>
                 <a:defRPr/>
               </a:pPr>
-              <a:t>38</a:t>
+              <a:t>39</a:t>
             </a:fld>
             <a:endParaRPr lang="en-US" dirty="0"/>
           </a:p>
@@ -6057,7 +6051,7 @@
     </p:spTree>
     <p:extLst>
       <p:ext uri="{BB962C8B-B14F-4D97-AF65-F5344CB8AC3E}">
-        <p14:creationId xmlns:p14="http://schemas.microsoft.com/office/powerpoint/2010/main" val="239676535"/>
+        <p14:creationId xmlns:p14="http://schemas.microsoft.com/office/powerpoint/2010/main" val="56818537"/>
       </p:ext>
     </p:extLst>
   </p:cSld>
@@ -6115,6 +6109,74 @@
           <a:p>
             <a:endParaRPr lang="en-US" dirty="0" smtClean="0"/>
           </a:p>
+          <a:p>
+            <a:endParaRPr lang="en-US" dirty="0" smtClean="0"/>
+          </a:p>
+          <a:p>
+            <a:r>
+              <a:rPr lang="en-US" sz="1200" u="sng" kern="1200" dirty="0" smtClean="0">
+                <a:solidFill>
+                  <a:schemeClr val="tx1"/>
+                </a:solidFill>
+                <a:effectLst/>
+                <a:latin typeface="Arial" panose="020B0604020202020204" pitchFamily="34" charset="0"/>
+                <a:ea typeface="ＭＳ Ｐゴシック" charset="0"/>
+                <a:cs typeface="Arial" panose="020B0604020202020204" pitchFamily="34" charset="0"/>
+                <a:hlinkClick r:id="rId3"/>
+              </a:rPr>
+              <a:t>https://chefio.atlassian.net/wiki/pages/viewpage.action?spaceKey=SE&amp;title=Week+1#Week1-Exercises.1</a:t>
+            </a:r>
+            <a:endParaRPr lang="en-US" sz="1200" kern="1200" dirty="0" smtClean="0">
+              <a:solidFill>
+                <a:schemeClr val="tx1"/>
+              </a:solidFill>
+              <a:effectLst/>
+              <a:latin typeface="Arial" panose="020B0604020202020204" pitchFamily="34" charset="0"/>
+              <a:ea typeface="ＭＳ Ｐゴシック" charset="0"/>
+              <a:cs typeface="Arial" panose="020B0604020202020204" pitchFamily="34" charset="0"/>
+            </a:endParaRPr>
+          </a:p>
+          <a:p>
+            <a:r>
+              <a:rPr lang="en-US" sz="1200" kern="1200" dirty="0" smtClean="0">
+                <a:solidFill>
+                  <a:schemeClr val="tx1"/>
+                </a:solidFill>
+                <a:effectLst/>
+                <a:latin typeface="Arial" panose="020B0604020202020204" pitchFamily="34" charset="0"/>
+                <a:ea typeface="ＭＳ Ｐゴシック" charset="0"/>
+                <a:cs typeface="Arial" panose="020B0604020202020204" pitchFamily="34" charset="0"/>
+              </a:rPr>
+              <a:t> </a:t>
+            </a:r>
+          </a:p>
+          <a:p>
+            <a:r>
+              <a:rPr lang="en-US" sz="1200" u="sng" kern="1200" dirty="0" smtClean="0">
+                <a:solidFill>
+                  <a:schemeClr val="tx1"/>
+                </a:solidFill>
+                <a:effectLst/>
+                <a:latin typeface="Arial" panose="020B0604020202020204" pitchFamily="34" charset="0"/>
+                <a:ea typeface="ＭＳ Ｐゴシック" charset="0"/>
+                <a:cs typeface="Arial" panose="020B0604020202020204" pitchFamily="34" charset="0"/>
+                <a:hlinkClick r:id="rId4"/>
+              </a:rPr>
+              <a:t>https://chefio.atlassian.net/wiki/display/SE/Week+2+-+Use+Cases#Week2-UseCases-Exercises-CIS</a:t>
+            </a:r>
+            <a:endParaRPr lang="en-US" sz="1200" kern="1200" dirty="0" smtClean="0">
+              <a:solidFill>
+                <a:schemeClr val="tx1"/>
+              </a:solidFill>
+              <a:effectLst/>
+              <a:latin typeface="Arial" panose="020B0604020202020204" pitchFamily="34" charset="0"/>
+              <a:ea typeface="ＭＳ Ｐゴシック" charset="0"/>
+              <a:cs typeface="Arial" panose="020B0604020202020204" pitchFamily="34" charset="0"/>
+            </a:endParaRPr>
+          </a:p>
+          <a:p>
+            <a:endParaRPr lang="en-US" dirty="0" smtClean="0"/>
+          </a:p>
         </p:txBody>
       </p:sp>
       <p:sp>
@@ -6140,7 +6202,7 @@
               <a:pPr>
                 <a:defRPr/>
               </a:pPr>
-              <a:t>40</a:t>
+              <a:t>41</a:t>
             </a:fld>
             <a:endParaRPr lang="en-US" dirty="0"/>
           </a:p>
@@ -17541,15 +17603,7 @@
             </a:br>
             <a:r>
               <a:rPr lang="en-US" dirty="0" smtClean="0"/>
-              <a:t>Compliance </a:t>
-            </a:r>
-            <a:r>
-              <a:rPr lang="en-US" dirty="0" smtClean="0"/>
-              <a:t>Frameworks - CIS </a:t>
-            </a:r>
-            <a:r>
-              <a:rPr lang="en-US" dirty="0" smtClean="0"/>
-              <a:t>Windows</a:t>
+              <a:t>Compliance Frameworks - CIS Windows</a:t>
             </a:r>
             <a:endParaRPr lang="en-US" dirty="0"/>
           </a:p>
@@ -21676,11 +21730,7 @@
             </a:r>
             <a:r>
               <a:rPr lang="en-US" dirty="0" smtClean="0"/>
-              <a:t>Rules </a:t>
-            </a:r>
-            <a:r>
-              <a:rPr lang="en-US" dirty="0" smtClean="0"/>
-              <a:t>for </a:t>
+              <a:t>Rules for </a:t>
             </a:r>
             <a:r>
               <a:rPr lang="en-US" dirty="0"/>
@@ -22851,17 +22901,12 @@
           <a:p>
             <a:r>
               <a:rPr lang="en-US" dirty="0" smtClean="0"/>
-              <a:t>GL: </a:t>
-            </a:r>
-            <a:r>
-              <a:rPr lang="en-US" dirty="0" smtClean="0"/>
-              <a:t>STIG </a:t>
+              <a:t>GL: STIG </a:t>
             </a:r>
             <a:r>
               <a:rPr lang="en-US" dirty="0"/>
               <a:t>Profiles for Red Hat 6</a:t>
             </a:r>
-            <a:endParaRPr lang="en-US" dirty="0"/>
           </a:p>
         </p:txBody>
       </p:sp>
@@ -22887,11 +22932,7 @@
           <a:p>
             <a:r>
               <a:rPr lang="en-US" dirty="0" smtClean="0"/>
-              <a:t>Your STIG viewer should now be populated with </a:t>
-            </a:r>
-            <a:r>
-              <a:rPr lang="en-US" dirty="0" smtClean="0"/>
-              <a:t>DoD </a:t>
+              <a:t>Your STIG viewer should now be populated with DoD </a:t>
             </a:r>
             <a:r>
               <a:rPr lang="en-US" dirty="0"/>
@@ -22899,15 +22940,7 @@
             </a:r>
             <a:r>
               <a:rPr lang="en-US" dirty="0" smtClean="0"/>
-              <a:t>Rule </a:t>
-            </a:r>
-            <a:r>
-              <a:rPr lang="en-US" dirty="0" smtClean="0"/>
-              <a:t>profiles</a:t>
-            </a:r>
-            <a:r>
-              <a:rPr lang="en-US" dirty="0" smtClean="0"/>
-              <a:t>.</a:t>
+              <a:t>Rule profiles.</a:t>
             </a:r>
           </a:p>
           <a:p>
@@ -23048,15 +23081,7 @@
           <a:p>
             <a:r>
               <a:rPr lang="en-US" dirty="0" smtClean="0"/>
-              <a:t>GL: </a:t>
-            </a:r>
-            <a:r>
-              <a:rPr lang="en-US" dirty="0" smtClean="0"/>
-              <a:t>Filter </a:t>
-            </a:r>
-            <a:r>
-              <a:rPr lang="en-US" dirty="0" smtClean="0"/>
-              <a:t>STIG Profiles</a:t>
+              <a:t>GL: Filter STIG Profiles</a:t>
             </a:r>
             <a:endParaRPr lang="en-US" dirty="0"/>
           </a:p>
@@ -23101,11 +23126,7 @@
           <a:p>
             <a:r>
               <a:rPr lang="en-US" dirty="0" smtClean="0"/>
-              <a:t>Notice how the center pane now lists only one </a:t>
-            </a:r>
-            <a:r>
-              <a:rPr lang="en-US" dirty="0" smtClean="0"/>
-              <a:t>DoD </a:t>
+              <a:t>Notice how the center pane now lists only one DoD </a:t>
             </a:r>
             <a:r>
               <a:rPr lang="en-US" dirty="0"/>
@@ -23303,11 +23324,7 @@
           <a:p>
             <a:r>
               <a:rPr lang="en-US" dirty="0" smtClean="0"/>
-              <a:t>GL: </a:t>
-            </a:r>
-            <a:r>
-              <a:rPr lang="en-US" dirty="0" smtClean="0"/>
-              <a:t>Writing Compliance Profiles from DoD Rules</a:t>
+              <a:t>GL: Writing Compliance Profiles from DoD Rules</a:t>
             </a:r>
             <a:endParaRPr lang="en-US" dirty="0"/>
           </a:p>
@@ -23540,10 +23557,6 @@
               </a:rPr>
               <a:t>end</a:t>
             </a:r>
-            <a:endParaRPr lang="en-US" sz="2000" b="1" dirty="0">
-              <a:latin typeface="Courier New" panose="02070309020205020404" pitchFamily="49" charset="0"/>
-              <a:cs typeface="Courier New" panose="02070309020205020404" pitchFamily="49" charset="0"/>
-            </a:endParaRPr>
           </a:p>
           <a:p>
             <a:r>
@@ -23693,11 +23706,7 @@
           <a:p>
             <a:r>
               <a:rPr lang="en-US" dirty="0" smtClean="0"/>
-              <a:t>GL: </a:t>
-            </a:r>
-            <a:r>
-              <a:rPr lang="en-US" dirty="0" smtClean="0"/>
-              <a:t>Writing Compliance Profiles from DoD Rules</a:t>
+              <a:t>GL: Writing Compliance Profiles from DoD Rules</a:t>
             </a:r>
             <a:endParaRPr lang="en-US" dirty="0"/>
           </a:p>
@@ -23930,10 +23939,6 @@
               </a:rPr>
               <a:t>end</a:t>
             </a:r>
-            <a:endParaRPr lang="en-US" sz="2000" b="1" dirty="0">
-              <a:latin typeface="Courier New" panose="02070309020205020404" pitchFamily="49" charset="0"/>
-              <a:cs typeface="Courier New" panose="02070309020205020404" pitchFamily="49" charset="0"/>
-            </a:endParaRPr>
           </a:p>
           <a:p>
             <a:r>
@@ -24236,54 +24241,139 @@
         </p:nvSpPr>
         <p:spPr/>
         <p:txBody>
-          <a:bodyPr>
-            <a:normAutofit fontScale="90000"/>
-          </a:bodyPr>
-          <a:lstStyle/>
-          <a:p>
-            <a:r>
-              <a:rPr lang="en-US" dirty="0" smtClean="0"/>
-              <a:t>GL: </a:t>
-            </a:r>
-            <a:r>
-              <a:rPr lang="en-US" dirty="0"/>
-              <a:t>TBD SCAP Roadmap.</a:t>
-            </a:r>
-            <a:br>
-              <a:rPr lang="en-US" dirty="0"/>
-            </a:br>
-            <a:endParaRPr lang="en-US" dirty="0"/>
-          </a:p>
-        </p:txBody>
-      </p:sp>
-      <p:sp>
-        <p:nvSpPr>
-          <p:cNvPr id="6" name="Text Placeholder 2"/>
-          <p:cNvSpPr>
-            <a:spLocks noGrp="1"/>
-          </p:cNvSpPr>
-          <p:nvPr>
-            <p:ph type="body" sz="quarter" idx="12"/>
-          </p:nvPr>
-        </p:nvSpPr>
-        <p:spPr>
-          <a:xfrm>
-            <a:off x="650040" y="1133476"/>
-            <a:ext cx="15461687" cy="6068676"/>
-          </a:xfrm>
-        </p:spPr>
-        <p:txBody>
           <a:bodyPr/>
           <a:lstStyle/>
           <a:p>
-            <a:endParaRPr lang="en-US" sz="2000" dirty="0" smtClean="0"/>
+            <a:r>
+              <a:rPr lang="en-US" dirty="0" smtClean="0"/>
+              <a:t>DoD </a:t>
+            </a:r>
+            <a:r>
+              <a:rPr lang="en-US" dirty="0"/>
+              <a:t>STIG References</a:t>
+            </a:r>
+          </a:p>
+        </p:txBody>
+      </p:sp>
+      <p:sp>
+        <p:nvSpPr>
+          <p:cNvPr id="3" name="Text Placeholder 2"/>
+          <p:cNvSpPr>
+            <a:spLocks noGrp="1"/>
+          </p:cNvSpPr>
+          <p:nvPr>
+            <p:ph type="body" sz="quarter" idx="12"/>
+          </p:nvPr>
+        </p:nvSpPr>
+        <p:spPr/>
+        <p:txBody>
+          <a:bodyPr/>
+          <a:lstStyle/>
+          <a:p>
+            <a:r>
+              <a:rPr lang="en-US" b="1" dirty="0"/>
+              <a:t>Windows 2012 </a:t>
+            </a:r>
+            <a:r>
+              <a:rPr lang="en-US" dirty="0"/>
+              <a:t>- </a:t>
+            </a:r>
+            <a:r>
+              <a:rPr lang="en-US" dirty="0">
+                <a:hlinkClick r:id="rId2"/>
+              </a:rPr>
+              <a:t>http://</a:t>
+            </a:r>
+            <a:r>
+              <a:rPr lang="en-US" dirty="0" smtClean="0">
+                <a:hlinkClick r:id="rId2"/>
+              </a:rPr>
+              <a:t>iase.disa.mil/stigs/os/windows/Pages/2012.aspx</a:t>
+            </a:r>
+            <a:endParaRPr lang="en-US" dirty="0" smtClean="0"/>
+          </a:p>
+          <a:p>
+            <a:endParaRPr lang="en-US" dirty="0" smtClean="0"/>
+          </a:p>
+          <a:p>
+            <a:r>
+              <a:rPr lang="en-US" b="1" dirty="0" smtClean="0"/>
+              <a:t>Unix/Linux </a:t>
+            </a:r>
+            <a:r>
+              <a:rPr lang="en-US" b="1" dirty="0"/>
+              <a:t>(Red Hat</a:t>
+            </a:r>
+            <a:r>
+              <a:rPr lang="en-US" b="1" dirty="0" smtClean="0"/>
+              <a:t>) </a:t>
+            </a:r>
+            <a:r>
+              <a:rPr lang="en-US" dirty="0" smtClean="0"/>
+              <a:t>- </a:t>
+            </a:r>
+            <a:r>
+              <a:rPr lang="en-US" dirty="0" smtClean="0">
+                <a:hlinkClick r:id="rId3"/>
+              </a:rPr>
+              <a:t>http</a:t>
+            </a:r>
+            <a:r>
+              <a:rPr lang="en-US" dirty="0">
+                <a:hlinkClick r:id="rId3"/>
+              </a:rPr>
+              <a:t>://</a:t>
+            </a:r>
+            <a:r>
+              <a:rPr lang="en-US" dirty="0" smtClean="0">
+                <a:hlinkClick r:id="rId3"/>
+              </a:rPr>
+              <a:t>iase.disa.mil/stigs/os/unix-linux/Pages/red-hat.aspx</a:t>
+            </a:r>
+            <a:endParaRPr lang="en-US" dirty="0" smtClean="0"/>
+          </a:p>
+          <a:p>
+            <a:endParaRPr lang="en-US" dirty="0"/>
+          </a:p>
+          <a:p>
+            <a:r>
+              <a:rPr lang="en-US" b="1" dirty="0" smtClean="0"/>
+              <a:t>All </a:t>
+            </a:r>
+            <a:r>
+              <a:rPr lang="en-US" b="1" dirty="0"/>
+              <a:t>Operating Systems </a:t>
+            </a:r>
+            <a:r>
+              <a:rPr lang="en-US" dirty="0"/>
+              <a:t>- </a:t>
+            </a:r>
+            <a:r>
+              <a:rPr lang="en-US" dirty="0">
+                <a:hlinkClick r:id="rId4"/>
+              </a:rPr>
+              <a:t>http://</a:t>
+            </a:r>
+            <a:r>
+              <a:rPr lang="en-US" dirty="0" smtClean="0">
+                <a:hlinkClick r:id="rId4"/>
+              </a:rPr>
+              <a:t>iase.disa.mil/stigs/os/Pages/index.aspx</a:t>
+            </a:r>
+            <a:endParaRPr lang="en-US" dirty="0" smtClean="0"/>
+          </a:p>
+          <a:p>
+            <a:endParaRPr lang="en-US" dirty="0"/>
+          </a:p>
+          <a:p>
+            <a:endParaRPr lang="en-US" dirty="0"/>
           </a:p>
         </p:txBody>
       </p:sp>
     </p:spTree>
     <p:extLst>
       <p:ext uri="{BB962C8B-B14F-4D97-AF65-F5344CB8AC3E}">
-        <p14:creationId xmlns:p14="http://schemas.microsoft.com/office/powerpoint/2010/main" val="774166730"/>
+        <p14:creationId xmlns:p14="http://schemas.microsoft.com/office/powerpoint/2010/main" val="2079614084"/>
       </p:ext>
     </p:extLst>
   </p:cSld>
@@ -24306,22 +24396,6 @@
 <file path=ppt/slides/slide39.xml><?xml version="1.0" encoding="utf-8"?>
 <p:sld xmlns:a="http://schemas.openxmlformats.org/drawingml/2006/main" xmlns:r="http://schemas.openxmlformats.org/officeDocument/2006/relationships" xmlns:p="http://schemas.openxmlformats.org/presentationml/2006/main">
   <p:cSld>
-    <p:bg>
-      <p:bgPr>
-        <a:gradFill rotWithShape="0">
-          <a:gsLst>
-            <a:gs pos="0">
-              <a:srgbClr val="F0F0F0"/>
-            </a:gs>
-            <a:gs pos="100000">
-              <a:schemeClr val="bg2"/>
-            </a:gs>
-          </a:gsLst>
-          <a:lin ang="5400000" scaled="1"/>
-        </a:gradFill>
-        <a:effectLst/>
-      </p:bgPr>
-    </p:bg>
     <p:spTree>
       <p:nvGrpSpPr>
         <p:cNvPr id="1" name=""/>
@@ -24348,129 +24422,57 @@
         </p:nvSpPr>
         <p:spPr/>
         <p:txBody>
+          <a:bodyPr>
+            <a:normAutofit fontScale="90000"/>
+          </a:bodyPr>
+          <a:lstStyle/>
+          <a:p>
+            <a:r>
+              <a:rPr lang="en-US" dirty="0" smtClean="0"/>
+              <a:t>GL: </a:t>
+            </a:r>
+            <a:r>
+              <a:rPr lang="en-US" dirty="0"/>
+              <a:t>TBD SCAP Roadmap.</a:t>
+            </a:r>
+            <a:br>
+              <a:rPr lang="en-US" dirty="0"/>
+            </a:br>
+            <a:endParaRPr lang="en-US" dirty="0"/>
+          </a:p>
+        </p:txBody>
+      </p:sp>
+      <p:sp>
+        <p:nvSpPr>
+          <p:cNvPr id="6" name="Text Placeholder 2"/>
+          <p:cNvSpPr>
+            <a:spLocks noGrp="1"/>
+          </p:cNvSpPr>
+          <p:nvPr>
+            <p:ph type="body" sz="quarter" idx="12"/>
+          </p:nvPr>
+        </p:nvSpPr>
+        <p:spPr>
+          <a:xfrm>
+            <a:off x="650040" y="1133476"/>
+            <a:ext cx="15461687" cy="6068676"/>
+          </a:xfrm>
+        </p:spPr>
+        <p:txBody>
           <a:bodyPr/>
           <a:lstStyle/>
           <a:p>
-            <a:r>
-              <a:rPr lang="en-US" dirty="0" smtClean="0"/>
-              <a:t>Review Questions</a:t>
-            </a:r>
-            <a:endParaRPr lang="en-US" dirty="0"/>
-          </a:p>
-        </p:txBody>
-      </p:sp>
-      <p:sp>
-        <p:nvSpPr>
-          <p:cNvPr id="3" name="Text Placeholder 2"/>
-          <p:cNvSpPr>
-            <a:spLocks noGrp="1"/>
-          </p:cNvSpPr>
-          <p:nvPr>
-            <p:ph type="body" sz="quarter" idx="12"/>
-          </p:nvPr>
-        </p:nvSpPr>
-        <p:spPr/>
-        <p:txBody>
-          <a:bodyPr/>
-          <a:lstStyle/>
-          <a:p>
-            <a:pPr marL="514350" indent="-514350">
-              <a:buFont typeface="+mj-lt"/>
-              <a:buAutoNum type="arabicPeriod"/>
-            </a:pPr>
-            <a:r>
-              <a:rPr lang="en-US" dirty="0" smtClean="0"/>
-              <a:t>What is ...?</a:t>
-            </a:r>
-            <a:br>
-              <a:rPr lang="en-US" dirty="0" smtClean="0"/>
-            </a:br>
-            <a:r>
-              <a:rPr lang="en-US" dirty="0" smtClean="0"/>
-              <a:t>______________________________</a:t>
-            </a:r>
-          </a:p>
-          <a:p>
-            <a:pPr marL="514350" indent="-514350">
-              <a:buFont typeface="+mj-lt"/>
-              <a:buAutoNum type="arabicPeriod"/>
-            </a:pPr>
-            <a:r>
-              <a:rPr lang="en-US" dirty="0" smtClean="0"/>
-              <a:t>Which is the correct answer?  </a:t>
-            </a:r>
-          </a:p>
-          <a:p>
-            <a:pPr marL="822325" lvl="1" indent="-514350">
-              <a:buFont typeface="+mj-lt"/>
-              <a:buAutoNum type="alphaLcPeriod"/>
-            </a:pPr>
-            <a:r>
-              <a:rPr lang="en-US" dirty="0" smtClean="0"/>
-              <a:t>answer</a:t>
-            </a:r>
-          </a:p>
-          <a:p>
-            <a:pPr marL="822325" lvl="1" indent="-514350">
-              <a:buFont typeface="+mj-lt"/>
-              <a:buAutoNum type="alphaLcPeriod"/>
-            </a:pPr>
-            <a:r>
-              <a:rPr lang="en-US" dirty="0" smtClean="0"/>
-              <a:t>answer</a:t>
-            </a:r>
-          </a:p>
-          <a:p>
-            <a:pPr marL="822325" lvl="1" indent="-514350">
-              <a:buFont typeface="+mj-lt"/>
-              <a:buAutoNum type="alphaLcPeriod"/>
-            </a:pPr>
-            <a:r>
-              <a:rPr lang="en-US" dirty="0" smtClean="0"/>
-              <a:t>answer</a:t>
-            </a:r>
-          </a:p>
-          <a:p>
-            <a:pPr marL="822325" lvl="1" indent="-514350">
-              <a:buFont typeface="+mj-lt"/>
-              <a:buAutoNum type="alphaLcPeriod"/>
-            </a:pPr>
-            <a:r>
-              <a:rPr lang="en-US" dirty="0" smtClean="0"/>
-              <a:t>answer</a:t>
-            </a:r>
-            <a:br>
-              <a:rPr lang="en-US" dirty="0" smtClean="0"/>
-            </a:br>
-            <a:endParaRPr lang="en-US" dirty="0" smtClean="0"/>
-          </a:p>
-          <a:p>
-            <a:pPr marL="514350" indent="-514350">
-              <a:buFont typeface="+mj-lt"/>
-              <a:buAutoNum type="arabicPeriod"/>
-            </a:pPr>
-            <a:r>
-              <a:rPr lang="en-US" dirty="0" smtClean="0"/>
-              <a:t>Capable of carrying on a conversation</a:t>
-            </a:r>
-          </a:p>
-          <a:p>
-            <a:pPr marL="514350" indent="-514350">
-              <a:buFont typeface="+mj-lt"/>
-              <a:buAutoNum type="arabicPeriod"/>
-            </a:pPr>
-            <a:r>
-              <a:rPr lang="en-US" dirty="0" smtClean="0"/>
-              <a:t>Explain</a:t>
-            </a:r>
-            <a:endParaRPr lang="en-US" dirty="0"/>
+            <a:endParaRPr lang="en-US" sz="2000" dirty="0" smtClean="0"/>
+          </a:p>
+          <a:p>
+            <a:endParaRPr lang="en-US" sz="2000" dirty="0" smtClean="0"/>
           </a:p>
         </p:txBody>
       </p:sp>
     </p:spTree>
     <p:extLst>
       <p:ext uri="{BB962C8B-B14F-4D97-AF65-F5344CB8AC3E}">
-        <p14:creationId xmlns:p14="http://schemas.microsoft.com/office/powerpoint/2010/main" val="321457963"/>
+        <p14:creationId xmlns:p14="http://schemas.microsoft.com/office/powerpoint/2010/main" val="3892361897"/>
       </p:ext>
     </p:extLst>
   </p:cSld>
@@ -24677,6 +24679,193 @@
 </file>
 
 <file path=ppt/slides/slide40.xml><?xml version="1.0" encoding="utf-8"?>
+<p:sld xmlns:a="http://schemas.openxmlformats.org/drawingml/2006/main" xmlns:r="http://schemas.openxmlformats.org/officeDocument/2006/relationships" xmlns:p="http://schemas.openxmlformats.org/presentationml/2006/main">
+  <p:cSld>
+    <p:bg>
+      <p:bgPr>
+        <a:gradFill rotWithShape="0">
+          <a:gsLst>
+            <a:gs pos="0">
+              <a:srgbClr val="F0F0F0"/>
+            </a:gs>
+            <a:gs pos="100000">
+              <a:schemeClr val="bg2"/>
+            </a:gs>
+          </a:gsLst>
+          <a:lin ang="5400000" scaled="1"/>
+        </a:gradFill>
+        <a:effectLst/>
+      </p:bgPr>
+    </p:bg>
+    <p:spTree>
+      <p:nvGrpSpPr>
+        <p:cNvPr id="1" name=""/>
+        <p:cNvGrpSpPr/>
+        <p:nvPr/>
+      </p:nvGrpSpPr>
+      <p:grpSpPr>
+        <a:xfrm>
+          <a:off x="0" y="0"/>
+          <a:ext cx="0" cy="0"/>
+          <a:chOff x="0" y="0"/>
+          <a:chExt cx="0" cy="0"/>
+        </a:xfrm>
+      </p:grpSpPr>
+      <p:sp>
+        <p:nvSpPr>
+          <p:cNvPr id="2" name="Title 1"/>
+          <p:cNvSpPr>
+            <a:spLocks noGrp="1"/>
+          </p:cNvSpPr>
+          <p:nvPr>
+            <p:ph type="title"/>
+          </p:nvPr>
+        </p:nvSpPr>
+        <p:spPr/>
+        <p:txBody>
+          <a:bodyPr/>
+          <a:lstStyle/>
+          <a:p>
+            <a:r>
+              <a:rPr lang="en-US" dirty="0" smtClean="0"/>
+              <a:t>Review Questions</a:t>
+            </a:r>
+            <a:endParaRPr lang="en-US" dirty="0"/>
+          </a:p>
+        </p:txBody>
+      </p:sp>
+      <p:sp>
+        <p:nvSpPr>
+          <p:cNvPr id="3" name="Text Placeholder 2"/>
+          <p:cNvSpPr>
+            <a:spLocks noGrp="1"/>
+          </p:cNvSpPr>
+          <p:nvPr>
+            <p:ph type="body" sz="quarter" idx="12"/>
+          </p:nvPr>
+        </p:nvSpPr>
+        <p:spPr/>
+        <p:txBody>
+          <a:bodyPr/>
+          <a:lstStyle/>
+          <a:p>
+            <a:pPr marL="514350" indent="-514350">
+              <a:buFont typeface="+mj-lt"/>
+              <a:buAutoNum type="arabicPeriod"/>
+            </a:pPr>
+            <a:r>
+              <a:rPr lang="en-US" dirty="0" smtClean="0"/>
+              <a:t>What is ...?</a:t>
+            </a:r>
+            <a:br>
+              <a:rPr lang="en-US" dirty="0" smtClean="0"/>
+            </a:br>
+            <a:r>
+              <a:rPr lang="en-US" dirty="0" smtClean="0"/>
+              <a:t>______________________________</a:t>
+            </a:r>
+          </a:p>
+          <a:p>
+            <a:pPr marL="514350" indent="-514350">
+              <a:buFont typeface="+mj-lt"/>
+              <a:buAutoNum type="arabicPeriod"/>
+            </a:pPr>
+            <a:r>
+              <a:rPr lang="en-US" dirty="0" smtClean="0"/>
+              <a:t>Which is the correct answer?  </a:t>
+            </a:r>
+          </a:p>
+          <a:p>
+            <a:pPr marL="822325" lvl="1" indent="-514350">
+              <a:buFont typeface="+mj-lt"/>
+              <a:buAutoNum type="alphaLcPeriod"/>
+            </a:pPr>
+            <a:r>
+              <a:rPr lang="en-US" dirty="0" smtClean="0"/>
+              <a:t>answer</a:t>
+            </a:r>
+          </a:p>
+          <a:p>
+            <a:pPr marL="822325" lvl="1" indent="-514350">
+              <a:buFont typeface="+mj-lt"/>
+              <a:buAutoNum type="alphaLcPeriod"/>
+            </a:pPr>
+            <a:r>
+              <a:rPr lang="en-US" dirty="0" smtClean="0"/>
+              <a:t>answer</a:t>
+            </a:r>
+          </a:p>
+          <a:p>
+            <a:pPr marL="822325" lvl="1" indent="-514350">
+              <a:buFont typeface="+mj-lt"/>
+              <a:buAutoNum type="alphaLcPeriod"/>
+            </a:pPr>
+            <a:r>
+              <a:rPr lang="en-US" dirty="0" smtClean="0"/>
+              <a:t>answer</a:t>
+            </a:r>
+          </a:p>
+          <a:p>
+            <a:pPr marL="822325" lvl="1" indent="-514350">
+              <a:buFont typeface="+mj-lt"/>
+              <a:buAutoNum type="alphaLcPeriod"/>
+            </a:pPr>
+            <a:r>
+              <a:rPr lang="en-US" dirty="0" smtClean="0"/>
+              <a:t>answer</a:t>
+            </a:r>
+            <a:br>
+              <a:rPr lang="en-US" dirty="0" smtClean="0"/>
+            </a:br>
+            <a:endParaRPr lang="en-US" dirty="0" smtClean="0"/>
+          </a:p>
+          <a:p>
+            <a:pPr marL="514350" indent="-514350">
+              <a:buFont typeface="+mj-lt"/>
+              <a:buAutoNum type="arabicPeriod"/>
+            </a:pPr>
+            <a:r>
+              <a:rPr lang="en-US" dirty="0" smtClean="0"/>
+              <a:t>Capable of carrying on a conversation</a:t>
+            </a:r>
+          </a:p>
+          <a:p>
+            <a:pPr marL="514350" indent="-514350">
+              <a:buFont typeface="+mj-lt"/>
+              <a:buAutoNum type="arabicPeriod"/>
+            </a:pPr>
+            <a:r>
+              <a:rPr lang="en-US" dirty="0" smtClean="0"/>
+              <a:t>Explain</a:t>
+            </a:r>
+            <a:endParaRPr lang="en-US" dirty="0"/>
+          </a:p>
+        </p:txBody>
+      </p:sp>
+    </p:spTree>
+    <p:extLst>
+      <p:ext uri="{BB962C8B-B14F-4D97-AF65-F5344CB8AC3E}">
+        <p14:creationId xmlns:p14="http://schemas.microsoft.com/office/powerpoint/2010/main" val="321457963"/>
+      </p:ext>
+    </p:extLst>
+  </p:cSld>
+  <p:clrMapOvr>
+    <a:masterClrMapping/>
+  </p:clrMapOvr>
+  <p:transition spd="med">
+    <p:fade/>
+  </p:transition>
+  <p:timing>
+    <p:tnLst>
+      <p:par>
+        <p:cTn id="1" dur="indefinite" restart="never" nodeType="tmRoot"/>
+      </p:par>
+    </p:tnLst>
+  </p:timing>
+</p:sld>
+</file>
+
+<file path=ppt/slides/slide41.xml><?xml version="1.0" encoding="utf-8"?>
 <p:sld xmlns:a="http://schemas.openxmlformats.org/drawingml/2006/main" xmlns:r="http://schemas.openxmlformats.org/officeDocument/2006/relationships" xmlns:p="http://schemas.openxmlformats.org/presentationml/2006/main">
   <p:cSld>
     <p:spTree>
@@ -24851,7 +25040,7 @@
 </p:sld>
 </file>
 
-<file path=ppt/slides/slide41.xml><?xml version="1.0" encoding="utf-8"?>
+<file path=ppt/slides/slide42.xml><?xml version="1.0" encoding="utf-8"?>
 <p:sld xmlns:a="http://schemas.openxmlformats.org/drawingml/2006/main" xmlns:r="http://schemas.openxmlformats.org/officeDocument/2006/relationships" xmlns:p="http://schemas.openxmlformats.org/presentationml/2006/main">
   <p:cSld>
     <p:spTree>

</xml_diff>